<commit_message>
Update Unit test lection
</commit_message>
<xml_diff>
--- a/Lections/03_Unit_tests.pptx
+++ b/Lections/03_Unit_tests.pptx
@@ -5,7 +5,7 @@
     <p:sldMasterId id="2147483648" r:id="rId1"/>
   </p:sldMasterIdLst>
   <p:notesMasterIdLst>
-    <p:notesMasterId r:id="rId32"/>
+    <p:notesMasterId r:id="rId33"/>
   </p:notesMasterIdLst>
   <p:sldIdLst>
     <p:sldId id="256" r:id="rId2"/>
@@ -38,6 +38,7 @@
     <p:sldId id="287" r:id="rId29"/>
     <p:sldId id="291" r:id="rId30"/>
     <p:sldId id="292" r:id="rId31"/>
+    <p:sldId id="293" r:id="rId32"/>
   </p:sldIdLst>
   <p:sldSz cx="12192000" cy="6858000"/>
   <p:notesSz cx="6858000" cy="9144000"/>
@@ -174,7 +175,7 @@
             <p14:sldId id="285"/>
           </p14:sldIdLst>
         </p14:section>
-        <p14:section name="Раздел без заголовка" id="{A0A4A08B-E034-4E38-A242-595861A2083C}">
+        <p14:section name="Проверка покрытия" id="{A0A4A08B-E034-4E38-A242-595861A2083C}">
           <p14:sldIdLst>
             <p14:sldId id="259"/>
             <p14:sldId id="288"/>
@@ -187,6 +188,7 @@
             <p14:sldId id="287"/>
             <p14:sldId id="291"/>
             <p14:sldId id="292"/>
+            <p14:sldId id="293"/>
           </p14:sldIdLst>
         </p14:section>
       </p14:sectionLst>
@@ -3269,7 +3271,7 @@
           <a:p>
             <a:fld id="{05B53CE8-B9E0-4488-8C98-715176E44FB9}" type="datetimeFigureOut">
               <a:rPr lang="ru-RU" smtClean="0"/>
-              <a:t>23.09.2022</a:t>
+              <a:t>30.09.2022</a:t>
             </a:fld>
             <a:endParaRPr lang="ru-RU"/>
           </a:p>
@@ -3920,7 +3922,7 @@
           <a:p>
             <a:fld id="{2C0D8B09-622E-4AF4-91C9-DE094D54159B}" type="datetimeFigureOut">
               <a:rPr lang="ru-RU" smtClean="0"/>
-              <a:t>23.09.2022</a:t>
+              <a:t>30.09.2022</a:t>
             </a:fld>
             <a:endParaRPr lang="ru-RU"/>
           </a:p>
@@ -4090,7 +4092,7 @@
           <a:p>
             <a:fld id="{2C0D8B09-622E-4AF4-91C9-DE094D54159B}" type="datetimeFigureOut">
               <a:rPr lang="ru-RU" smtClean="0"/>
-              <a:t>23.09.2022</a:t>
+              <a:t>30.09.2022</a:t>
             </a:fld>
             <a:endParaRPr lang="ru-RU"/>
           </a:p>
@@ -4270,7 +4272,7 @@
           <a:p>
             <a:fld id="{2C0D8B09-622E-4AF4-91C9-DE094D54159B}" type="datetimeFigureOut">
               <a:rPr lang="ru-RU" smtClean="0"/>
-              <a:t>23.09.2022</a:t>
+              <a:t>30.09.2022</a:t>
             </a:fld>
             <a:endParaRPr lang="ru-RU"/>
           </a:p>
@@ -4440,7 +4442,7 @@
           <a:p>
             <a:fld id="{2C0D8B09-622E-4AF4-91C9-DE094D54159B}" type="datetimeFigureOut">
               <a:rPr lang="ru-RU" smtClean="0"/>
-              <a:t>23.09.2022</a:t>
+              <a:t>30.09.2022</a:t>
             </a:fld>
             <a:endParaRPr lang="ru-RU"/>
           </a:p>
@@ -4686,7 +4688,7 @@
           <a:p>
             <a:fld id="{2C0D8B09-622E-4AF4-91C9-DE094D54159B}" type="datetimeFigureOut">
               <a:rPr lang="ru-RU" smtClean="0"/>
-              <a:t>23.09.2022</a:t>
+              <a:t>30.09.2022</a:t>
             </a:fld>
             <a:endParaRPr lang="ru-RU"/>
           </a:p>
@@ -4918,7 +4920,7 @@
           <a:p>
             <a:fld id="{2C0D8B09-622E-4AF4-91C9-DE094D54159B}" type="datetimeFigureOut">
               <a:rPr lang="ru-RU" smtClean="0"/>
-              <a:t>23.09.2022</a:t>
+              <a:t>30.09.2022</a:t>
             </a:fld>
             <a:endParaRPr lang="ru-RU"/>
           </a:p>
@@ -5285,7 +5287,7 @@
           <a:p>
             <a:fld id="{2C0D8B09-622E-4AF4-91C9-DE094D54159B}" type="datetimeFigureOut">
               <a:rPr lang="ru-RU" smtClean="0"/>
-              <a:t>23.09.2022</a:t>
+              <a:t>30.09.2022</a:t>
             </a:fld>
             <a:endParaRPr lang="ru-RU"/>
           </a:p>
@@ -5403,7 +5405,7 @@
           <a:p>
             <a:fld id="{2C0D8B09-622E-4AF4-91C9-DE094D54159B}" type="datetimeFigureOut">
               <a:rPr lang="ru-RU" smtClean="0"/>
-              <a:t>23.09.2022</a:t>
+              <a:t>30.09.2022</a:t>
             </a:fld>
             <a:endParaRPr lang="ru-RU"/>
           </a:p>
@@ -5498,7 +5500,7 @@
           <a:p>
             <a:fld id="{2C0D8B09-622E-4AF4-91C9-DE094D54159B}" type="datetimeFigureOut">
               <a:rPr lang="ru-RU" smtClean="0"/>
-              <a:t>23.09.2022</a:t>
+              <a:t>30.09.2022</a:t>
             </a:fld>
             <a:endParaRPr lang="ru-RU"/>
           </a:p>
@@ -5775,7 +5777,7 @@
           <a:p>
             <a:fld id="{2C0D8B09-622E-4AF4-91C9-DE094D54159B}" type="datetimeFigureOut">
               <a:rPr lang="ru-RU" smtClean="0"/>
-              <a:t>23.09.2022</a:t>
+              <a:t>30.09.2022</a:t>
             </a:fld>
             <a:endParaRPr lang="ru-RU"/>
           </a:p>
@@ -6028,7 +6030,7 @@
           <a:p>
             <a:fld id="{2C0D8B09-622E-4AF4-91C9-DE094D54159B}" type="datetimeFigureOut">
               <a:rPr lang="ru-RU" smtClean="0"/>
-              <a:t>23.09.2022</a:t>
+              <a:t>30.09.2022</a:t>
             </a:fld>
             <a:endParaRPr lang="ru-RU"/>
           </a:p>
@@ -6241,7 +6243,7 @@
           <a:p>
             <a:fld id="{2C0D8B09-622E-4AF4-91C9-DE094D54159B}" type="datetimeFigureOut">
               <a:rPr lang="ru-RU" smtClean="0"/>
-              <a:t>23.09.2022</a:t>
+              <a:t>30.09.2022</a:t>
             </a:fld>
             <a:endParaRPr lang="ru-RU"/>
           </a:p>
@@ -6816,7 +6818,7 @@
         <p:spPr>
           <a:xfrm>
             <a:off x="940965" y="1767191"/>
-            <a:ext cx="4495800" cy="2677656"/>
+            <a:ext cx="4495800" cy="3108543"/>
           </a:xfrm>
           <a:prstGeom prst="rect">
             <a:avLst/>
@@ -7005,16 +7007,115 @@
               <a:t>user.Validate</a:t>
             </a:r>
             <a:r>
+              <a:rPr lang="en-GB" sz="1400" dirty="0" smtClean="0">
+                <a:solidFill>
+                  <a:prstClr val="black"/>
+                </a:solidFill>
+                <a:latin typeface="Consolas"/>
+              </a:rPr>
+              <a:t>();</a:t>
+            </a:r>
+          </a:p>
+          <a:p>
+            <a:endParaRPr lang="en-GB" sz="1400" dirty="0">
+              <a:solidFill>
+                <a:prstClr val="black"/>
+              </a:solidFill>
+              <a:latin typeface="Consolas"/>
+            </a:endParaRPr>
+          </a:p>
+          <a:p>
+            <a:r>
+              <a:rPr lang="en-GB" sz="1400" dirty="0" smtClean="0">
+                <a:solidFill>
+                  <a:prstClr val="black"/>
+                </a:solidFill>
+                <a:latin typeface="Consolas"/>
+              </a:rPr>
+              <a:t>        </a:t>
+            </a:r>
+            <a:r>
+              <a:rPr lang="en-GB" sz="1400" dirty="0" err="1" smtClean="0">
+                <a:solidFill>
+                  <a:srgbClr val="2B91AF"/>
+                </a:solidFill>
+                <a:latin typeface="Consolas"/>
+              </a:rPr>
+              <a:t>UserDao</a:t>
+            </a:r>
+            <a:r>
+              <a:rPr lang="en-GB" sz="1400" dirty="0" smtClean="0">
+                <a:solidFill>
+                  <a:prstClr val="black"/>
+                </a:solidFill>
+                <a:latin typeface="Consolas"/>
+              </a:rPr>
+              <a:t> </a:t>
+            </a:r>
+            <a:r>
+              <a:rPr lang="en-GB" sz="1400" dirty="0" err="1">
+                <a:solidFill>
+                  <a:prstClr val="black"/>
+                </a:solidFill>
+                <a:latin typeface="Consolas"/>
+              </a:rPr>
+              <a:t>daoUser</a:t>
+            </a:r>
+            <a:r>
               <a:rPr lang="en-GB" sz="1400" dirty="0">
                 <a:solidFill>
                   <a:prstClr val="black"/>
                 </a:solidFill>
                 <a:latin typeface="Consolas"/>
               </a:rPr>
+              <a:t> = </a:t>
+            </a:r>
+            <a:r>
+              <a:rPr lang="en-GB" sz="1400" dirty="0">
+                <a:solidFill>
+                  <a:srgbClr val="0000FF"/>
+                </a:solidFill>
+                <a:latin typeface="Consolas"/>
+              </a:rPr>
+              <a:t>new</a:t>
+            </a:r>
+            <a:r>
+              <a:rPr lang="en-GB" sz="1400" dirty="0">
+                <a:solidFill>
+                  <a:prstClr val="black"/>
+                </a:solidFill>
+                <a:latin typeface="Consolas"/>
+              </a:rPr>
+              <a:t> </a:t>
+            </a:r>
+            <a:r>
+              <a:rPr lang="en-GB" sz="1400" dirty="0" err="1">
+                <a:solidFill>
+                  <a:srgbClr val="2B91AF"/>
+                </a:solidFill>
+                <a:latin typeface="Consolas"/>
+              </a:rPr>
+              <a:t>UserDao</a:t>
+            </a:r>
+            <a:r>
+              <a:rPr lang="en-GB" sz="1400" dirty="0" smtClean="0">
+                <a:solidFill>
+                  <a:prstClr val="black"/>
+                </a:solidFill>
+                <a:latin typeface="Consolas"/>
+              </a:rPr>
               <a:t>();</a:t>
             </a:r>
           </a:p>
           <a:p>
+            <a:endParaRPr lang="en-GB" sz="1400" dirty="0">
+              <a:solidFill>
+                <a:prstClr val="black"/>
+              </a:solidFill>
+              <a:latin typeface="Consolas"/>
+            </a:endParaRPr>
+          </a:p>
+          <a:p>
             <a:r>
               <a:rPr lang="en-GB" sz="1400" dirty="0">
                 <a:solidFill>
@@ -7025,13 +7126,22 @@
               <a:t>        </a:t>
             </a:r>
             <a:r>
-              <a:rPr lang="en-GB" sz="1400" dirty="0" err="1">
-                <a:solidFill>
-                  <a:srgbClr val="2B91AF"/>
-                </a:solidFill>
-                <a:latin typeface="Consolas"/>
-              </a:rPr>
-              <a:t>UserDao</a:t>
+              <a:rPr lang="en-GB" sz="1400" dirty="0" smtClean="0">
+                <a:solidFill>
+                  <a:srgbClr val="0000FF"/>
+                </a:solidFill>
+                <a:latin typeface="Consolas"/>
+              </a:rPr>
+              <a:t>if</a:t>
+            </a:r>
+            <a:r>
+              <a:rPr lang="en-GB" sz="1400" dirty="0" smtClean="0">
+                <a:solidFill>
+                  <a:prstClr val="black"/>
+                </a:solidFill>
+                <a:latin typeface="Consolas"/>
+              </a:rPr>
+              <a:t> </a:t>
             </a:r>
             <a:r>
               <a:rPr lang="en-GB" sz="1400" dirty="0">
@@ -7040,90 +7150,7 @@
                 </a:solidFill>
                 <a:latin typeface="Consolas"/>
               </a:rPr>
-              <a:t> </a:t>
-            </a:r>
-            <a:r>
-              <a:rPr lang="en-GB" sz="1400" dirty="0" err="1">
-                <a:solidFill>
-                  <a:prstClr val="black"/>
-                </a:solidFill>
-                <a:latin typeface="Consolas"/>
-              </a:rPr>
-              <a:t>daoUser</a:t>
-            </a:r>
-            <a:r>
-              <a:rPr lang="en-GB" sz="1400" dirty="0">
-                <a:solidFill>
-                  <a:prstClr val="black"/>
-                </a:solidFill>
-                <a:latin typeface="Consolas"/>
-              </a:rPr>
-              <a:t> = </a:t>
-            </a:r>
-            <a:r>
-              <a:rPr lang="en-GB" sz="1400" dirty="0">
-                <a:solidFill>
-                  <a:srgbClr val="0000FF"/>
-                </a:solidFill>
-                <a:latin typeface="Consolas"/>
-              </a:rPr>
-              <a:t>new</a:t>
-            </a:r>
-            <a:r>
-              <a:rPr lang="en-GB" sz="1400" dirty="0">
-                <a:solidFill>
-                  <a:prstClr val="black"/>
-                </a:solidFill>
-                <a:latin typeface="Consolas"/>
-              </a:rPr>
-              <a:t> </a:t>
-            </a:r>
-            <a:r>
-              <a:rPr lang="en-GB" sz="1400" dirty="0" err="1">
-                <a:solidFill>
-                  <a:srgbClr val="2B91AF"/>
-                </a:solidFill>
-                <a:latin typeface="Consolas"/>
-              </a:rPr>
-              <a:t>UserDao</a:t>
-            </a:r>
-            <a:r>
-              <a:rPr lang="en-GB" sz="1400" dirty="0">
-                <a:solidFill>
-                  <a:prstClr val="black"/>
-                </a:solidFill>
-                <a:latin typeface="Consolas"/>
-              </a:rPr>
-              <a:t>();</a:t>
-            </a:r>
-          </a:p>
-          <a:p>
-            <a:r>
-              <a:rPr lang="en-GB" sz="1400" dirty="0">
-                <a:solidFill>
-                  <a:prstClr val="black"/>
-                </a:solidFill>
-                <a:latin typeface="Consolas"/>
-              </a:rPr>
-              <a:t>        </a:t>
-            </a:r>
-            <a:r>
-              <a:rPr lang="en-GB" sz="1400" dirty="0">
-                <a:solidFill>
-                  <a:srgbClr val="0000FF"/>
-                </a:solidFill>
-                <a:latin typeface="Consolas"/>
-              </a:rPr>
-              <a:t>if</a:t>
-            </a:r>
-            <a:r>
-              <a:rPr lang="en-GB" sz="1400" dirty="0">
-                <a:solidFill>
-                  <a:prstClr val="black"/>
-                </a:solidFill>
-                <a:latin typeface="Consolas"/>
-              </a:rPr>
-              <a:t> (</a:t>
+              <a:t>(</a:t>
             </a:r>
             <a:r>
               <a:rPr lang="en-GB" sz="1400" dirty="0" err="1">
@@ -7297,7 +7324,7 @@
                                         <p:tgtEl>
                                           <p:spTgt spid="4">
                                             <p:txEl>
-                                              <p:pRg st="5" end="5"/>
+                                              <p:pRg st="6" end="6"/>
                                             </p:txEl>
                                           </p:spTgt>
                                         </p:tgtEl>
@@ -7590,8 +7617,12 @@
               <a:t>классы-заместители (</a:t>
             </a:r>
             <a:r>
+              <a:rPr lang="en-US" b="1" dirty="0"/>
+              <a:t>stubs</a:t>
+            </a:r>
+            <a:r>
               <a:rPr lang="en-US" dirty="0"/>
-              <a:t>stubs)</a:t>
+              <a:t>)</a:t>
             </a:r>
             <a:endParaRPr lang="ru-RU" dirty="0"/>
           </a:p>
@@ -7614,15 +7645,15 @@
               <a:t>(</a:t>
             </a:r>
             <a:r>
-              <a:rPr lang="en-US" dirty="0" err="1"/>
+              <a:rPr lang="en-US" b="1" dirty="0" smtClean="0"/>
               <a:t>mo</a:t>
             </a:r>
             <a:r>
-              <a:rPr lang="ru-RU" dirty="0"/>
-              <a:t>с</a:t>
-            </a:r>
-            <a:r>
-              <a:rPr lang="en-US" dirty="0" err="1"/>
+              <a:rPr lang="en-US" b="1" dirty="0"/>
+              <a:t>c</a:t>
+            </a:r>
+            <a:r>
+              <a:rPr lang="en-US" b="1" dirty="0" smtClean="0"/>
               <a:t>ks</a:t>
             </a:r>
             <a:r>
@@ -8074,7 +8105,7 @@
         <p:spPr>
           <a:xfrm>
             <a:off x="6880372" y="1110843"/>
-            <a:ext cx="4321791" cy="5262979"/>
+            <a:ext cx="4321791" cy="4185761"/>
           </a:xfrm>
           <a:prstGeom prst="rect">
             <a:avLst/>
@@ -8233,7 +8264,7 @@
               <a:t>    </a:t>
             </a:r>
             <a:r>
-              <a:rPr lang="en-GB" sz="1400" dirty="0">
+              <a:rPr lang="en-GB" sz="1400" dirty="0" smtClean="0">
                 <a:solidFill>
                   <a:srgbClr val="0000FF"/>
                 </a:solidFill>
@@ -8242,149 +8273,7 @@
               <a:t>public</a:t>
             </a:r>
             <a:r>
-              <a:rPr lang="en-GB" sz="1400" dirty="0">
-                <a:solidFill>
-                  <a:prstClr val="black"/>
-                </a:solidFill>
-                <a:latin typeface="Consolas"/>
-              </a:rPr>
-              <a:t> </a:t>
-            </a:r>
-            <a:r>
-              <a:rPr lang="en-GB" sz="1400" dirty="0" err="1">
-                <a:solidFill>
-                  <a:prstClr val="black"/>
-                </a:solidFill>
-                <a:latin typeface="Consolas"/>
-              </a:rPr>
-              <a:t>UserBC</a:t>
-            </a:r>
-            <a:r>
-              <a:rPr lang="en-GB" sz="1400" dirty="0">
-                <a:solidFill>
-                  <a:prstClr val="black"/>
-                </a:solidFill>
-                <a:latin typeface="Consolas"/>
-              </a:rPr>
-              <a:t>()</a:t>
-            </a:r>
-          </a:p>
-          <a:p>
-            <a:r>
-              <a:rPr lang="ru-RU" sz="1400" dirty="0">
-                <a:solidFill>
-                  <a:prstClr val="black"/>
-                </a:solidFill>
-                <a:latin typeface="Consolas"/>
-              </a:rPr>
-              <a:t>    {</a:t>
-            </a:r>
-          </a:p>
-          <a:p>
-            <a:r>
-              <a:rPr lang="en-GB" sz="1400" dirty="0">
-                <a:solidFill>
-                  <a:prstClr val="black"/>
-                </a:solidFill>
-                <a:latin typeface="Consolas"/>
-              </a:rPr>
-              <a:t>        _</a:t>
-            </a:r>
-            <a:r>
-              <a:rPr lang="en-GB" sz="1400" dirty="0" err="1">
-                <a:solidFill>
-                  <a:prstClr val="black"/>
-                </a:solidFill>
-                <a:latin typeface="Consolas"/>
-              </a:rPr>
-              <a:t>daoUser</a:t>
-            </a:r>
-            <a:r>
-              <a:rPr lang="en-GB" sz="1400" dirty="0">
-                <a:solidFill>
-                  <a:prstClr val="black"/>
-                </a:solidFill>
-                <a:latin typeface="Consolas"/>
-              </a:rPr>
-              <a:t> = </a:t>
-            </a:r>
-            <a:r>
-              <a:rPr lang="en-GB" sz="1400" dirty="0">
-                <a:solidFill>
-                  <a:srgbClr val="0000FF"/>
-                </a:solidFill>
-                <a:latin typeface="Consolas"/>
-              </a:rPr>
-              <a:t>new</a:t>
-            </a:r>
-            <a:r>
-              <a:rPr lang="en-GB" sz="1400" dirty="0">
-                <a:solidFill>
-                  <a:prstClr val="black"/>
-                </a:solidFill>
-                <a:latin typeface="Consolas"/>
-              </a:rPr>
-              <a:t> </a:t>
-            </a:r>
-            <a:r>
-              <a:rPr lang="en-GB" sz="1400" dirty="0" err="1">
-                <a:solidFill>
-                  <a:srgbClr val="2B91AF"/>
-                </a:solidFill>
-                <a:latin typeface="Consolas"/>
-              </a:rPr>
-              <a:t>UserDao</a:t>
-            </a:r>
-            <a:r>
-              <a:rPr lang="en-GB" sz="1400" dirty="0">
-                <a:solidFill>
-                  <a:prstClr val="black"/>
-                </a:solidFill>
-                <a:latin typeface="Consolas"/>
-              </a:rPr>
-              <a:t>();</a:t>
-            </a:r>
-          </a:p>
-          <a:p>
-            <a:r>
-              <a:rPr lang="ru-RU" sz="1400" dirty="0">
-                <a:solidFill>
-                  <a:prstClr val="black"/>
-                </a:solidFill>
-                <a:latin typeface="Consolas"/>
-              </a:rPr>
-              <a:t>    }</a:t>
-            </a:r>
-          </a:p>
-          <a:p>
-            <a:endParaRPr lang="ru-RU" sz="1400" dirty="0">
-              <a:solidFill>
-                <a:prstClr val="black"/>
-              </a:solidFill>
-              <a:latin typeface="Consolas"/>
-            </a:endParaRPr>
-          </a:p>
-          <a:p>
-            <a:r>
-              <a:rPr lang="ru-RU" sz="1400" dirty="0">
-                <a:solidFill>
-                  <a:srgbClr val="0000FF"/>
-                </a:solidFill>
-                <a:latin typeface="Consolas"/>
-              </a:rPr>
-              <a:t>    </a:t>
-            </a:r>
-            <a:r>
-              <a:rPr lang="en-GB" sz="1400" dirty="0">
-                <a:solidFill>
-                  <a:srgbClr val="0000FF"/>
-                </a:solidFill>
-                <a:latin typeface="Consolas"/>
-              </a:rPr>
-              <a:t>public</a:t>
-            </a:r>
-            <a:r>
-              <a:rPr lang="en-GB" sz="1400" dirty="0">
+              <a:rPr lang="en-GB" sz="1400" dirty="0" smtClean="0">
                 <a:solidFill>
                   <a:prstClr val="black"/>
                 </a:solidFill>
@@ -9208,12 +9097,6 @@
               </a:rPr>
               <a:t>;</a:t>
             </a:r>
-            <a:endParaRPr lang="en-GB" sz="1400" dirty="0">
-              <a:solidFill>
-                <a:prstClr val="black"/>
-              </a:solidFill>
-              <a:latin typeface="Consolas"/>
-            </a:endParaRPr>
           </a:p>
           <a:p>
             <a:r>
@@ -9278,24 +9161,198 @@
                 </a:solidFill>
                 <a:latin typeface="Consolas"/>
               </a:rPr>
+              <a:t> Insert(</a:t>
+            </a:r>
+            <a:r>
+              <a:rPr lang="en-GB" sz="1400" dirty="0">
+                <a:solidFill>
+                  <a:srgbClr val="0000FF"/>
+                </a:solidFill>
+                <a:latin typeface="Consolas"/>
+              </a:rPr>
+              <a:t>ref</a:t>
+            </a:r>
+            <a:r>
+              <a:rPr lang="en-GB" sz="1400" dirty="0">
+                <a:solidFill>
+                  <a:prstClr val="black"/>
+                </a:solidFill>
+                <a:latin typeface="Consolas"/>
+              </a:rPr>
               <a:t> </a:t>
             </a:r>
             <a:r>
+              <a:rPr lang="en-GB" sz="1400" dirty="0" err="1">
+                <a:solidFill>
+                  <a:srgbClr val="2B91AF"/>
+                </a:solidFill>
+                <a:latin typeface="Consolas"/>
+              </a:rPr>
+              <a:t>IUserInfo</a:t>
+            </a:r>
+            <a:r>
               <a:rPr lang="en-GB" sz="1400" dirty="0">
                 <a:solidFill>
                   <a:prstClr val="black"/>
                 </a:solidFill>
                 <a:latin typeface="Consolas"/>
               </a:rPr>
-              <a:t>Insert(</a:t>
-            </a:r>
+              <a:t> user)</a:t>
+            </a:r>
+          </a:p>
+          <a:p>
+            <a:r>
+              <a:rPr lang="ru-RU" sz="1400" dirty="0">
+                <a:solidFill>
+                  <a:prstClr val="black"/>
+                </a:solidFill>
+                <a:latin typeface="Consolas"/>
+              </a:rPr>
+              <a:t>    {</a:t>
+            </a:r>
+          </a:p>
+          <a:p>
             <a:r>
               <a:rPr lang="en-GB" sz="1400" dirty="0">
                 <a:solidFill>
+                  <a:prstClr val="black"/>
+                </a:solidFill>
+                <a:latin typeface="Consolas"/>
+              </a:rPr>
+              <a:t>        user.ID = UserResult.ID;</a:t>
+            </a:r>
+          </a:p>
+          <a:p>
+            <a:r>
+              <a:rPr lang="en-GB" sz="1400" dirty="0">
+                <a:solidFill>
+                  <a:prstClr val="black"/>
+                </a:solidFill>
+                <a:latin typeface="Consolas"/>
+              </a:rPr>
+              <a:t>        </a:t>
+            </a:r>
+            <a:r>
+              <a:rPr lang="en-GB" sz="1400" dirty="0" err="1">
+                <a:solidFill>
+                  <a:prstClr val="black"/>
+                </a:solidFill>
+                <a:latin typeface="Consolas"/>
+              </a:rPr>
+              <a:t>user.Name</a:t>
+            </a:r>
+            <a:r>
+              <a:rPr lang="en-GB" sz="1400" dirty="0">
+                <a:solidFill>
+                  <a:prstClr val="black"/>
+                </a:solidFill>
+                <a:latin typeface="Consolas"/>
+              </a:rPr>
+              <a:t> = </a:t>
+            </a:r>
+            <a:r>
+              <a:rPr lang="en-GB" sz="1400" dirty="0" err="1">
+                <a:solidFill>
+                  <a:prstClr val="black"/>
+                </a:solidFill>
+                <a:latin typeface="Consolas"/>
+              </a:rPr>
+              <a:t>UserResult.Name</a:t>
+            </a:r>
+            <a:r>
+              <a:rPr lang="en-GB" sz="1400" dirty="0">
+                <a:solidFill>
+                  <a:prstClr val="black"/>
+                </a:solidFill>
+                <a:latin typeface="Consolas"/>
+              </a:rPr>
+              <a:t>;</a:t>
+            </a:r>
+          </a:p>
+          <a:p>
+            <a:r>
+              <a:rPr lang="en-US" sz="1400" dirty="0">
+                <a:solidFill>
+                  <a:prstClr val="black"/>
+                </a:solidFill>
+                <a:latin typeface="Consolas"/>
+              </a:rPr>
+              <a:t>    </a:t>
+            </a:r>
+            <a:r>
+              <a:rPr lang="ru-RU" sz="1400" dirty="0">
+                <a:solidFill>
+                  <a:prstClr val="black"/>
+                </a:solidFill>
+                <a:latin typeface="Consolas"/>
+              </a:rPr>
+              <a:t>}</a:t>
+            </a:r>
+          </a:p>
+          <a:p>
+            <a:r>
+              <a:rPr lang="ru-RU" sz="1400" dirty="0">
+                <a:solidFill>
+                  <a:prstClr val="black"/>
+                </a:solidFill>
+                <a:latin typeface="Consolas"/>
+              </a:rPr>
+              <a:t>    </a:t>
+            </a:r>
+          </a:p>
+          <a:p>
+            <a:r>
+              <a:rPr lang="en-GB" sz="1400" dirty="0">
+                <a:solidFill>
+                  <a:prstClr val="black"/>
+                </a:solidFill>
+                <a:latin typeface="Consolas"/>
+              </a:rPr>
+              <a:t>    </a:t>
+            </a:r>
+            <a:r>
+              <a:rPr lang="en-GB" sz="1400" dirty="0">
+                <a:solidFill>
                   <a:srgbClr val="0000FF"/>
                 </a:solidFill>
                 <a:latin typeface="Consolas"/>
               </a:rPr>
+              <a:t>public</a:t>
+            </a:r>
+            <a:r>
+              <a:rPr lang="en-GB" sz="1400" dirty="0">
+                <a:solidFill>
+                  <a:prstClr val="black"/>
+                </a:solidFill>
+                <a:latin typeface="Consolas"/>
+              </a:rPr>
+              <a:t> </a:t>
+            </a:r>
+            <a:r>
+              <a:rPr lang="en-GB" sz="1400" dirty="0">
+                <a:solidFill>
+                  <a:srgbClr val="0000FF"/>
+                </a:solidFill>
+                <a:latin typeface="Consolas"/>
+              </a:rPr>
+              <a:t>void</a:t>
+            </a:r>
+            <a:r>
+              <a:rPr lang="en-GB" sz="1400" dirty="0">
+                <a:solidFill>
+                  <a:prstClr val="black"/>
+                </a:solidFill>
+                <a:latin typeface="Consolas"/>
+              </a:rPr>
+              <a:t> Update(</a:t>
+            </a:r>
+            <a:r>
+              <a:rPr lang="en-GB" sz="1400" dirty="0">
+                <a:solidFill>
+                  <a:srgbClr val="0000FF"/>
+                </a:solidFill>
+                <a:latin typeface="Consolas"/>
+              </a:rPr>
               <a:t>ref</a:t>
             </a:r>
             <a:r>
@@ -9323,16 +9380,7 @@
                 </a:solidFill>
                 <a:latin typeface="Consolas"/>
               </a:rPr>
-              <a:t> </a:t>
-            </a:r>
-            <a:r>
-              <a:rPr lang="en-GB" sz="1400" dirty="0">
-                <a:solidFill>
-                  <a:prstClr val="black"/>
-                </a:solidFill>
-                <a:latin typeface="Consolas"/>
-              </a:rPr>
-              <a:t>user)</a:t>
+              <a:t> user)</a:t>
             </a:r>
           </a:p>
           <a:p>
@@ -9348,64 +9396,6 @@
           </a:p>
           <a:p>
             <a:r>
-              <a:rPr lang="en-GB" sz="1400" dirty="0">
-                <a:solidFill>
-                  <a:prstClr val="black"/>
-                </a:solidFill>
-                <a:latin typeface="Consolas"/>
-              </a:rPr>
-              <a:t>        user.ID = UserResult.ID;</a:t>
-            </a:r>
-          </a:p>
-          <a:p>
-            <a:r>
-              <a:rPr lang="en-GB" sz="1400" dirty="0">
-                <a:solidFill>
-                  <a:prstClr val="black"/>
-                </a:solidFill>
-                <a:latin typeface="Consolas"/>
-              </a:rPr>
-              <a:t>        </a:t>
-            </a:r>
-            <a:r>
-              <a:rPr lang="en-GB" sz="1400" dirty="0" err="1">
-                <a:solidFill>
-                  <a:prstClr val="black"/>
-                </a:solidFill>
-                <a:latin typeface="Consolas"/>
-              </a:rPr>
-              <a:t>user.Name</a:t>
-            </a:r>
-            <a:r>
-              <a:rPr lang="en-GB" sz="1400" dirty="0">
-                <a:solidFill>
-                  <a:prstClr val="black"/>
-                </a:solidFill>
-                <a:latin typeface="Consolas"/>
-              </a:rPr>
-              <a:t> = </a:t>
-            </a:r>
-            <a:r>
-              <a:rPr lang="en-GB" sz="1400" dirty="0" err="1">
-                <a:solidFill>
-                  <a:prstClr val="black"/>
-                </a:solidFill>
-                <a:latin typeface="Consolas"/>
-              </a:rPr>
-              <a:t>UserResult.Name</a:t>
-            </a:r>
-            <a:r>
-              <a:rPr lang="en-GB" sz="1400" dirty="0">
-                <a:solidFill>
-                  <a:prstClr val="black"/>
-                </a:solidFill>
-                <a:latin typeface="Consolas"/>
-              </a:rPr>
-              <a:t>;</a:t>
-            </a:r>
-          </a:p>
-          <a:p>
-            <a:r>
               <a:rPr lang="en-US" sz="1400" dirty="0">
                 <a:solidFill>
                   <a:prstClr val="black"/>
@@ -9423,161 +9413,6 @@
               </a:rPr>
               <a:t>}</a:t>
             </a:r>
-            <a:endParaRPr lang="ru-RU" sz="1400" dirty="0">
-              <a:solidFill>
-                <a:prstClr val="black"/>
-              </a:solidFill>
-              <a:latin typeface="Consolas"/>
-            </a:endParaRPr>
-          </a:p>
-          <a:p>
-            <a:r>
-              <a:rPr lang="ru-RU" sz="1400" dirty="0">
-                <a:solidFill>
-                  <a:prstClr val="black"/>
-                </a:solidFill>
-                <a:latin typeface="Consolas"/>
-              </a:rPr>
-              <a:t>    </a:t>
-            </a:r>
-          </a:p>
-          <a:p>
-            <a:r>
-              <a:rPr lang="en-GB" sz="1400" dirty="0">
-                <a:solidFill>
-                  <a:prstClr val="black"/>
-                </a:solidFill>
-                <a:latin typeface="Consolas"/>
-              </a:rPr>
-              <a:t>    </a:t>
-            </a:r>
-            <a:r>
-              <a:rPr lang="en-GB" sz="1400" dirty="0">
-                <a:solidFill>
-                  <a:srgbClr val="0000FF"/>
-                </a:solidFill>
-                <a:latin typeface="Consolas"/>
-              </a:rPr>
-              <a:t>public</a:t>
-            </a:r>
-            <a:r>
-              <a:rPr lang="en-GB" sz="1400" dirty="0">
-                <a:solidFill>
-                  <a:prstClr val="black"/>
-                </a:solidFill>
-                <a:latin typeface="Consolas"/>
-              </a:rPr>
-              <a:t> </a:t>
-            </a:r>
-            <a:r>
-              <a:rPr lang="en-GB" sz="1400" dirty="0">
-                <a:solidFill>
-                  <a:srgbClr val="0000FF"/>
-                </a:solidFill>
-                <a:latin typeface="Consolas"/>
-              </a:rPr>
-              <a:t>void</a:t>
-            </a:r>
-            <a:r>
-              <a:rPr lang="en-GB" sz="1400" dirty="0">
-                <a:solidFill>
-                  <a:prstClr val="black"/>
-                </a:solidFill>
-                <a:latin typeface="Consolas"/>
-              </a:rPr>
-              <a:t> </a:t>
-            </a:r>
-            <a:r>
-              <a:rPr lang="en-GB" sz="1400" dirty="0">
-                <a:solidFill>
-                  <a:prstClr val="black"/>
-                </a:solidFill>
-                <a:latin typeface="Consolas"/>
-              </a:rPr>
-              <a:t>Update(</a:t>
-            </a:r>
-            <a:r>
-              <a:rPr lang="en-GB" sz="1400" dirty="0">
-                <a:solidFill>
-                  <a:srgbClr val="0000FF"/>
-                </a:solidFill>
-                <a:latin typeface="Consolas"/>
-              </a:rPr>
-              <a:t>ref</a:t>
-            </a:r>
-            <a:r>
-              <a:rPr lang="en-GB" sz="1400" dirty="0">
-                <a:solidFill>
-                  <a:prstClr val="black"/>
-                </a:solidFill>
-                <a:latin typeface="Consolas"/>
-              </a:rPr>
-              <a:t> </a:t>
-            </a:r>
-            <a:r>
-              <a:rPr lang="en-GB" sz="1400" dirty="0" err="1">
-                <a:solidFill>
-                  <a:srgbClr val="2B91AF"/>
-                </a:solidFill>
-                <a:latin typeface="Consolas"/>
-              </a:rPr>
-              <a:t>IUserInfo</a:t>
-            </a:r>
-            <a:r>
-              <a:rPr lang="en-GB" sz="1400" dirty="0">
-                <a:solidFill>
-                  <a:prstClr val="black"/>
-                </a:solidFill>
-                <a:latin typeface="Consolas"/>
-              </a:rPr>
-              <a:t> </a:t>
-            </a:r>
-            <a:r>
-              <a:rPr lang="en-GB" sz="1400" dirty="0">
-                <a:solidFill>
-                  <a:prstClr val="black"/>
-                </a:solidFill>
-                <a:latin typeface="Consolas"/>
-              </a:rPr>
-              <a:t>user)</a:t>
-            </a:r>
-          </a:p>
-          <a:p>
-            <a:r>
-              <a:rPr lang="ru-RU" sz="1400" dirty="0">
-                <a:solidFill>
-                  <a:prstClr val="black"/>
-                </a:solidFill>
-                <a:latin typeface="Consolas"/>
-              </a:rPr>
-              <a:t>    {</a:t>
-            </a:r>
-          </a:p>
-          <a:p>
-            <a:r>
-              <a:rPr lang="en-US" sz="1400" dirty="0">
-                <a:solidFill>
-                  <a:prstClr val="black"/>
-                </a:solidFill>
-                <a:latin typeface="Consolas"/>
-              </a:rPr>
-              <a:t>    </a:t>
-            </a:r>
-            <a:r>
-              <a:rPr lang="ru-RU" sz="1400" dirty="0">
-                <a:solidFill>
-                  <a:prstClr val="black"/>
-                </a:solidFill>
-                <a:latin typeface="Consolas"/>
-              </a:rPr>
-              <a:t>}</a:t>
-            </a:r>
-            <a:endParaRPr lang="ru-RU" sz="1400" dirty="0">
-              <a:solidFill>
-                <a:prstClr val="black"/>
-              </a:solidFill>
-              <a:latin typeface="Consolas"/>
-            </a:endParaRPr>
           </a:p>
           <a:p>
             <a:r>
@@ -11253,16 +11088,7 @@
                 </a:solidFill>
                 <a:latin typeface="Consolas"/>
               </a:rPr>
-              <a:t> </a:t>
-            </a:r>
-            <a:r>
-              <a:rPr lang="en-GB" sz="1400" dirty="0">
-                <a:solidFill>
-                  <a:prstClr val="black"/>
-                </a:solidFill>
-                <a:latin typeface="Consolas"/>
-              </a:rPr>
-              <a:t>       </a:t>
+              <a:t>        </a:t>
             </a:r>
             <a:r>
               <a:rPr lang="en-GB" sz="1400" dirty="0">
@@ -11409,6 +11235,243 @@
               </a:rPr>
               <a:t> logger)</a:t>
             </a:r>
+          </a:p>
+          <a:p>
+            <a:r>
+              <a:rPr lang="ru-RU" sz="1400" dirty="0">
+                <a:solidFill>
+                  <a:prstClr val="black"/>
+                </a:solidFill>
+                <a:latin typeface="Consolas"/>
+              </a:rPr>
+              <a:t>        {</a:t>
+            </a:r>
+          </a:p>
+          <a:p>
+            <a:r>
+              <a:rPr lang="en-GB" sz="1400" dirty="0">
+                <a:solidFill>
+                  <a:prstClr val="black"/>
+                </a:solidFill>
+                <a:latin typeface="Consolas"/>
+              </a:rPr>
+              <a:t>            _</a:t>
+            </a:r>
+            <a:r>
+              <a:rPr lang="en-GB" sz="1400" dirty="0" err="1">
+                <a:solidFill>
+                  <a:prstClr val="black"/>
+                </a:solidFill>
+                <a:latin typeface="Consolas"/>
+              </a:rPr>
+              <a:t>daoUser</a:t>
+            </a:r>
+            <a:r>
+              <a:rPr lang="en-GB" sz="1400" dirty="0">
+                <a:solidFill>
+                  <a:prstClr val="black"/>
+                </a:solidFill>
+                <a:latin typeface="Consolas"/>
+              </a:rPr>
+              <a:t> = </a:t>
+            </a:r>
+            <a:r>
+              <a:rPr lang="en-GB" sz="1400" dirty="0" err="1">
+                <a:solidFill>
+                  <a:prstClr val="black"/>
+                </a:solidFill>
+                <a:latin typeface="Consolas"/>
+              </a:rPr>
+              <a:t>daoUser</a:t>
+            </a:r>
+            <a:r>
+              <a:rPr lang="en-GB" sz="1400" dirty="0">
+                <a:solidFill>
+                  <a:prstClr val="black"/>
+                </a:solidFill>
+                <a:latin typeface="Consolas"/>
+              </a:rPr>
+              <a:t>;</a:t>
+            </a:r>
+          </a:p>
+          <a:p>
+            <a:r>
+              <a:rPr lang="en-GB" sz="1400" dirty="0">
+                <a:solidFill>
+                  <a:prstClr val="black"/>
+                </a:solidFill>
+                <a:latin typeface="Consolas"/>
+              </a:rPr>
+              <a:t>            _logger = logger;</a:t>
+            </a:r>
+            <a:endParaRPr lang="en-US" sz="1400" dirty="0">
+              <a:solidFill>
+                <a:prstClr val="black"/>
+              </a:solidFill>
+              <a:latin typeface="Consolas"/>
+            </a:endParaRPr>
+          </a:p>
+          <a:p>
+            <a:r>
+              <a:rPr lang="ru-RU" sz="1400" dirty="0">
+                <a:solidFill>
+                  <a:prstClr val="black"/>
+                </a:solidFill>
+                <a:latin typeface="Consolas"/>
+              </a:rPr>
+              <a:t>        }</a:t>
+            </a:r>
+          </a:p>
+          <a:p>
+            <a:endParaRPr lang="ru-RU" sz="1400" dirty="0">
+              <a:solidFill>
+                <a:prstClr val="black"/>
+              </a:solidFill>
+              <a:latin typeface="Consolas"/>
+            </a:endParaRPr>
+          </a:p>
+          <a:p>
+            <a:r>
+              <a:rPr lang="en-GB" sz="1400" dirty="0">
+                <a:solidFill>
+                  <a:prstClr val="black"/>
+                </a:solidFill>
+                <a:latin typeface="Consolas"/>
+              </a:rPr>
+              <a:t>        </a:t>
+            </a:r>
+            <a:r>
+              <a:rPr lang="en-GB" sz="1400" dirty="0">
+                <a:solidFill>
+                  <a:srgbClr val="0000FF"/>
+                </a:solidFill>
+                <a:latin typeface="Consolas"/>
+              </a:rPr>
+              <a:t>public</a:t>
+            </a:r>
+            <a:r>
+              <a:rPr lang="en-GB" sz="1400" dirty="0">
+                <a:solidFill>
+                  <a:prstClr val="black"/>
+                </a:solidFill>
+                <a:latin typeface="Consolas"/>
+              </a:rPr>
+              <a:t> </a:t>
+            </a:r>
+            <a:r>
+              <a:rPr lang="en-GB" sz="1400" dirty="0">
+                <a:solidFill>
+                  <a:srgbClr val="0000FF"/>
+                </a:solidFill>
+                <a:latin typeface="Consolas"/>
+              </a:rPr>
+              <a:t>void</a:t>
+            </a:r>
+            <a:r>
+              <a:rPr lang="en-GB" sz="1400" dirty="0">
+                <a:solidFill>
+                  <a:prstClr val="black"/>
+                </a:solidFill>
+                <a:latin typeface="Consolas"/>
+              </a:rPr>
+              <a:t> </a:t>
+            </a:r>
+            <a:r>
+              <a:rPr lang="en-GB" sz="1400" dirty="0" err="1">
+                <a:solidFill>
+                  <a:prstClr val="black"/>
+                </a:solidFill>
+                <a:latin typeface="Consolas"/>
+              </a:rPr>
+              <a:t>SaveUser</a:t>
+            </a:r>
+            <a:r>
+              <a:rPr lang="en-GB" sz="1400" dirty="0">
+                <a:solidFill>
+                  <a:prstClr val="black"/>
+                </a:solidFill>
+                <a:latin typeface="Consolas"/>
+              </a:rPr>
+              <a:t>(</a:t>
+            </a:r>
+            <a:r>
+              <a:rPr lang="en-GB" sz="1400" dirty="0" err="1">
+                <a:solidFill>
+                  <a:srgbClr val="2B91AF"/>
+                </a:solidFill>
+                <a:latin typeface="Consolas"/>
+              </a:rPr>
+              <a:t>IUserInfo</a:t>
+            </a:r>
+            <a:r>
+              <a:rPr lang="en-GB" sz="1400" dirty="0">
+                <a:solidFill>
+                  <a:prstClr val="black"/>
+                </a:solidFill>
+                <a:latin typeface="Consolas"/>
+              </a:rPr>
+              <a:t> user)</a:t>
+            </a:r>
+          </a:p>
+          <a:p>
+            <a:r>
+              <a:rPr lang="ru-RU" sz="1400" dirty="0">
+                <a:solidFill>
+                  <a:prstClr val="black"/>
+                </a:solidFill>
+                <a:latin typeface="Consolas"/>
+              </a:rPr>
+              <a:t>        {</a:t>
+            </a:r>
+          </a:p>
+          <a:p>
+            <a:r>
+              <a:rPr lang="en-GB" sz="1400" dirty="0">
+                <a:solidFill>
+                  <a:prstClr val="black"/>
+                </a:solidFill>
+                <a:latin typeface="Consolas"/>
+              </a:rPr>
+              <a:t>            _</a:t>
+            </a:r>
+            <a:r>
+              <a:rPr lang="en-GB" sz="1400" dirty="0" err="1">
+                <a:solidFill>
+                  <a:prstClr val="black"/>
+                </a:solidFill>
+                <a:latin typeface="Consolas"/>
+              </a:rPr>
+              <a:t>logger.Trace</a:t>
+            </a:r>
+            <a:r>
+              <a:rPr lang="en-GB" sz="1400" dirty="0">
+                <a:solidFill>
+                  <a:prstClr val="black"/>
+                </a:solidFill>
+                <a:latin typeface="Consolas"/>
+              </a:rPr>
+              <a:t>(“Call </a:t>
+            </a:r>
+            <a:r>
+              <a:rPr lang="en-GB" sz="1400" dirty="0" err="1">
+                <a:solidFill>
+                  <a:prstClr val="black"/>
+                </a:solidFill>
+                <a:latin typeface="Consolas"/>
+              </a:rPr>
+              <a:t>SaveUser</a:t>
+            </a:r>
+            <a:r>
+              <a:rPr lang="en-GB" sz="1400" dirty="0">
+                <a:solidFill>
+                  <a:prstClr val="black"/>
+                </a:solidFill>
+                <a:latin typeface="Consolas"/>
+              </a:rPr>
+              <a:t> method”);</a:t>
+            </a:r>
+          </a:p>
+          <a:p>
             <a:endParaRPr lang="en-GB" sz="1400" dirty="0">
               <a:solidFill>
                 <a:prstClr val="black"/>
@@ -11418,24 +11481,13 @@
           </a:p>
           <a:p>
             <a:r>
-              <a:rPr lang="ru-RU" sz="1400" dirty="0">
-                <a:solidFill>
-                  <a:prstClr val="black"/>
-                </a:solidFill>
-                <a:latin typeface="Consolas"/>
-              </a:rPr>
-              <a:t>        {</a:t>
-            </a:r>
-          </a:p>
-          <a:p>
-            <a:r>
               <a:rPr lang="en-GB" sz="1400" dirty="0">
                 <a:solidFill>
                   <a:prstClr val="black"/>
                 </a:solidFill>
                 <a:latin typeface="Consolas"/>
               </a:rPr>
-              <a:t>            _</a:t>
+              <a:t>	   </a:t>
             </a:r>
             <a:r>
               <a:rPr lang="en-GB" sz="1400" dirty="0" err="1">
@@ -11444,7 +11496,7 @@
                 </a:solidFill>
                 <a:latin typeface="Consolas"/>
               </a:rPr>
-              <a:t>daoUser</a:t>
+              <a:t>user.Validate</a:t>
             </a:r>
             <a:r>
               <a:rPr lang="en-GB" sz="1400" dirty="0">
@@ -11453,89 +11505,7 @@
                 </a:solidFill>
                 <a:latin typeface="Consolas"/>
               </a:rPr>
-              <a:t> = </a:t>
-            </a:r>
-            <a:r>
-              <a:rPr lang="en-GB" sz="1400" dirty="0" err="1">
-                <a:solidFill>
-                  <a:prstClr val="black"/>
-                </a:solidFill>
-                <a:latin typeface="Consolas"/>
-              </a:rPr>
-              <a:t>daoUser</a:t>
-            </a:r>
-            <a:r>
-              <a:rPr lang="en-GB" sz="1400" dirty="0">
-                <a:solidFill>
-                  <a:prstClr val="black"/>
-                </a:solidFill>
-                <a:latin typeface="Consolas"/>
-              </a:rPr>
-              <a:t>;</a:t>
-            </a:r>
-          </a:p>
-          <a:p>
-            <a:r>
-              <a:rPr lang="en-GB" sz="1400" dirty="0">
-                <a:solidFill>
-                  <a:prstClr val="black"/>
-                </a:solidFill>
-                <a:latin typeface="Consolas"/>
-              </a:rPr>
-              <a:t> </a:t>
-            </a:r>
-            <a:r>
-              <a:rPr lang="en-GB" sz="1400" dirty="0">
-                <a:solidFill>
-                  <a:prstClr val="black"/>
-                </a:solidFill>
-                <a:latin typeface="Consolas"/>
-              </a:rPr>
-              <a:t>           _logger </a:t>
-            </a:r>
-            <a:r>
-              <a:rPr lang="en-GB" sz="1400" dirty="0">
-                <a:solidFill>
-                  <a:prstClr val="black"/>
-                </a:solidFill>
-                <a:latin typeface="Consolas"/>
-              </a:rPr>
-              <a:t>= </a:t>
-            </a:r>
-            <a:r>
-              <a:rPr lang="en-GB" sz="1400" dirty="0">
-                <a:solidFill>
-                  <a:prstClr val="black"/>
-                </a:solidFill>
-                <a:latin typeface="Consolas"/>
-              </a:rPr>
-              <a:t>logger;</a:t>
-            </a:r>
-            <a:endParaRPr lang="en-US" sz="1400" dirty="0">
-              <a:solidFill>
-                <a:prstClr val="black"/>
-              </a:solidFill>
-              <a:latin typeface="Consolas"/>
-            </a:endParaRPr>
-          </a:p>
-          <a:p>
-            <a:r>
-              <a:rPr lang="ru-RU" sz="1400" dirty="0">
-                <a:solidFill>
-                  <a:prstClr val="black"/>
-                </a:solidFill>
-                <a:latin typeface="Consolas"/>
-              </a:rPr>
-              <a:t>        </a:t>
-            </a:r>
-            <a:r>
-              <a:rPr lang="ru-RU" sz="1400" dirty="0">
-                <a:solidFill>
-                  <a:prstClr val="black"/>
-                </a:solidFill>
-                <a:latin typeface="Consolas"/>
-              </a:rPr>
-              <a:t>}</a:t>
+              <a:t>();</a:t>
             </a:r>
           </a:p>
           <a:p>
@@ -11554,7 +11524,7 @@
                 </a:solidFill>
                 <a:latin typeface="Consolas"/>
               </a:rPr>
-              <a:t>        </a:t>
+              <a:t>            </a:t>
             </a:r>
             <a:r>
               <a:rPr lang="en-GB" sz="1400" dirty="0">
@@ -11563,7 +11533,7 @@
                 </a:solidFill>
                 <a:latin typeface="Consolas"/>
               </a:rPr>
-              <a:t>public</a:t>
+              <a:t>if</a:t>
             </a:r>
             <a:r>
               <a:rPr lang="en-GB" sz="1400" dirty="0">
@@ -11572,149 +11542,75 @@
                 </a:solidFill>
                 <a:latin typeface="Consolas"/>
               </a:rPr>
-              <a:t> </a:t>
+              <a:t> (</a:t>
+            </a:r>
+            <a:r>
+              <a:rPr lang="en-GB" sz="1400" dirty="0" err="1">
+                <a:solidFill>
+                  <a:prstClr val="black"/>
+                </a:solidFill>
+                <a:latin typeface="Consolas"/>
+              </a:rPr>
+              <a:t>user.IsNew</a:t>
             </a:r>
             <a:r>
               <a:rPr lang="en-GB" sz="1400" dirty="0">
                 <a:solidFill>
+                  <a:prstClr val="black"/>
+                </a:solidFill>
+                <a:latin typeface="Consolas"/>
+              </a:rPr>
+              <a:t>)</a:t>
+            </a:r>
+          </a:p>
+          <a:p>
+            <a:r>
+              <a:rPr lang="en-GB" sz="1400" dirty="0">
+                <a:solidFill>
+                  <a:prstClr val="black"/>
+                </a:solidFill>
+                <a:latin typeface="Consolas"/>
+              </a:rPr>
+              <a:t>                _</a:t>
+            </a:r>
+            <a:r>
+              <a:rPr lang="en-GB" sz="1400" dirty="0" err="1">
+                <a:solidFill>
+                  <a:prstClr val="black"/>
+                </a:solidFill>
+                <a:latin typeface="Consolas"/>
+              </a:rPr>
+              <a:t>daoUser.Insert</a:t>
+            </a:r>
+            <a:r>
+              <a:rPr lang="en-GB" sz="1400" dirty="0">
+                <a:solidFill>
+                  <a:prstClr val="black"/>
+                </a:solidFill>
+                <a:latin typeface="Consolas"/>
+              </a:rPr>
+              <a:t>(user);</a:t>
+            </a:r>
+          </a:p>
+          <a:p>
+            <a:r>
+              <a:rPr lang="en-GB" sz="1400" dirty="0">
+                <a:solidFill>
+                  <a:prstClr val="black"/>
+                </a:solidFill>
+                <a:latin typeface="Consolas"/>
+              </a:rPr>
+              <a:t>            </a:t>
+            </a:r>
+            <a:r>
+              <a:rPr lang="en-GB" sz="1400" dirty="0">
+                <a:solidFill>
                   <a:srgbClr val="0000FF"/>
                 </a:solidFill>
                 <a:latin typeface="Consolas"/>
               </a:rPr>
-              <a:t>void</a:t>
-            </a:r>
-            <a:r>
-              <a:rPr lang="en-GB" sz="1400" dirty="0">
-                <a:solidFill>
-                  <a:prstClr val="black"/>
-                </a:solidFill>
-                <a:latin typeface="Consolas"/>
-              </a:rPr>
-              <a:t> </a:t>
-            </a:r>
-            <a:r>
-              <a:rPr lang="en-GB" sz="1400" dirty="0" err="1">
-                <a:solidFill>
-                  <a:prstClr val="black"/>
-                </a:solidFill>
-                <a:latin typeface="Consolas"/>
-              </a:rPr>
-              <a:t>SaveUser</a:t>
-            </a:r>
-            <a:r>
-              <a:rPr lang="en-GB" sz="1400" dirty="0">
-                <a:solidFill>
-                  <a:prstClr val="black"/>
-                </a:solidFill>
-                <a:latin typeface="Consolas"/>
-              </a:rPr>
-              <a:t>(</a:t>
-            </a:r>
-            <a:r>
-              <a:rPr lang="en-GB" sz="1400" dirty="0" err="1">
-                <a:solidFill>
-                  <a:srgbClr val="2B91AF"/>
-                </a:solidFill>
-                <a:latin typeface="Consolas"/>
-              </a:rPr>
-              <a:t>IUserInfo</a:t>
-            </a:r>
-            <a:r>
-              <a:rPr lang="en-GB" sz="1400" dirty="0">
-                <a:solidFill>
-                  <a:prstClr val="black"/>
-                </a:solidFill>
-                <a:latin typeface="Consolas"/>
-              </a:rPr>
-              <a:t> </a:t>
-            </a:r>
-            <a:r>
-              <a:rPr lang="en-GB" sz="1400" dirty="0">
-                <a:solidFill>
-                  <a:prstClr val="black"/>
-                </a:solidFill>
-                <a:latin typeface="Consolas"/>
-              </a:rPr>
-              <a:t>user)</a:t>
-            </a:r>
-          </a:p>
-          <a:p>
-            <a:r>
-              <a:rPr lang="ru-RU" sz="1400" dirty="0">
-                <a:solidFill>
-                  <a:prstClr val="black"/>
-                </a:solidFill>
-                <a:latin typeface="Consolas"/>
-              </a:rPr>
-              <a:t>        {</a:t>
-            </a:r>
-          </a:p>
-          <a:p>
-            <a:r>
-              <a:rPr lang="en-GB" sz="1400" dirty="0">
-                <a:solidFill>
-                  <a:prstClr val="black"/>
-                </a:solidFill>
-                <a:latin typeface="Consolas"/>
-              </a:rPr>
-              <a:t>            </a:t>
-            </a:r>
-            <a:r>
-              <a:rPr lang="en-GB" sz="1400" dirty="0">
-                <a:solidFill>
-                  <a:prstClr val="black"/>
-                </a:solidFill>
-                <a:latin typeface="Consolas"/>
-              </a:rPr>
-              <a:t>_</a:t>
-            </a:r>
-            <a:r>
-              <a:rPr lang="en-GB" sz="1400" dirty="0" err="1">
-                <a:solidFill>
-                  <a:prstClr val="black"/>
-                </a:solidFill>
-                <a:latin typeface="Consolas"/>
-              </a:rPr>
-              <a:t>logger.Trace</a:t>
-            </a:r>
-            <a:r>
-              <a:rPr lang="en-GB" sz="1400" dirty="0">
-                <a:solidFill>
-                  <a:prstClr val="black"/>
-                </a:solidFill>
-                <a:latin typeface="Consolas"/>
-              </a:rPr>
-              <a:t>(“</a:t>
-            </a:r>
-            <a:r>
-              <a:rPr lang="en-GB" sz="1400" dirty="0">
-                <a:solidFill>
-                  <a:prstClr val="black"/>
-                </a:solidFill>
-                <a:latin typeface="Consolas"/>
-              </a:rPr>
-              <a:t>Call </a:t>
-            </a:r>
-            <a:r>
-              <a:rPr lang="en-GB" sz="1400" dirty="0" err="1">
-                <a:solidFill>
-                  <a:prstClr val="black"/>
-                </a:solidFill>
-                <a:latin typeface="Consolas"/>
-              </a:rPr>
-              <a:t>SaveUser</a:t>
-            </a:r>
-            <a:r>
-              <a:rPr lang="en-GB" sz="1400" dirty="0">
-                <a:solidFill>
-                  <a:prstClr val="black"/>
-                </a:solidFill>
-                <a:latin typeface="Consolas"/>
-              </a:rPr>
-              <a:t> method”);</a:t>
-            </a:r>
-          </a:p>
-          <a:p>
+              <a:t>else</a:t>
+            </a:r>
             <a:endParaRPr lang="en-GB" sz="1400" dirty="0">
               <a:solidFill>
                 <a:prstClr val="black"/>
@@ -11730,7 +11626,16 @@
                 </a:solidFill>
                 <a:latin typeface="Consolas"/>
               </a:rPr>
-              <a:t>	</a:t>
+              <a:t>                _</a:t>
+            </a:r>
+            <a:r>
+              <a:rPr lang="en-GB" sz="1400" dirty="0" err="1">
+                <a:solidFill>
+                  <a:prstClr val="black"/>
+                </a:solidFill>
+                <a:latin typeface="Consolas"/>
+              </a:rPr>
+              <a:t>daoUser.Update</a:t>
             </a:r>
             <a:r>
               <a:rPr lang="en-GB" sz="1400" dirty="0">
@@ -11739,168 +11644,11 @@
                 </a:solidFill>
                 <a:latin typeface="Consolas"/>
               </a:rPr>
-              <a:t>   </a:t>
-            </a:r>
-            <a:r>
-              <a:rPr lang="en-GB" sz="1400" dirty="0" err="1">
-                <a:solidFill>
-                  <a:prstClr val="black"/>
-                </a:solidFill>
-                <a:latin typeface="Consolas"/>
-              </a:rPr>
-              <a:t>user.Validate</a:t>
-            </a:r>
-            <a:r>
-              <a:rPr lang="en-GB" sz="1400" dirty="0">
-                <a:solidFill>
-                  <a:prstClr val="black"/>
-                </a:solidFill>
-                <a:latin typeface="Consolas"/>
-              </a:rPr>
-              <a:t>();</a:t>
-            </a:r>
-          </a:p>
-          <a:p>
-            <a:endParaRPr lang="ru-RU" sz="1400" dirty="0">
-              <a:solidFill>
-                <a:prstClr val="black"/>
-              </a:solidFill>
-              <a:latin typeface="Consolas"/>
-            </a:endParaRPr>
-          </a:p>
-          <a:p>
-            <a:r>
-              <a:rPr lang="en-GB" sz="1400" dirty="0">
-                <a:solidFill>
-                  <a:prstClr val="black"/>
-                </a:solidFill>
-                <a:latin typeface="Consolas"/>
-              </a:rPr>
-              <a:t>            </a:t>
-            </a:r>
-            <a:r>
-              <a:rPr lang="en-GB" sz="1400" dirty="0">
-                <a:solidFill>
-                  <a:srgbClr val="0000FF"/>
-                </a:solidFill>
-                <a:latin typeface="Consolas"/>
-              </a:rPr>
-              <a:t>if</a:t>
-            </a:r>
-            <a:r>
-              <a:rPr lang="en-GB" sz="1400" dirty="0">
-                <a:solidFill>
-                  <a:prstClr val="black"/>
-                </a:solidFill>
-                <a:latin typeface="Consolas"/>
-              </a:rPr>
-              <a:t> (</a:t>
-            </a:r>
-            <a:r>
-              <a:rPr lang="en-GB" sz="1400" dirty="0" err="1">
-                <a:solidFill>
-                  <a:prstClr val="black"/>
-                </a:solidFill>
-                <a:latin typeface="Consolas"/>
-              </a:rPr>
-              <a:t>user.IsNew</a:t>
-            </a:r>
-            <a:r>
-              <a:rPr lang="en-GB" sz="1400" dirty="0">
-                <a:solidFill>
-                  <a:prstClr val="black"/>
-                </a:solidFill>
-                <a:latin typeface="Consolas"/>
-              </a:rPr>
-              <a:t>)</a:t>
-            </a:r>
-          </a:p>
-          <a:p>
-            <a:r>
-              <a:rPr lang="en-GB" sz="1400" dirty="0">
-                <a:solidFill>
-                  <a:prstClr val="black"/>
-                </a:solidFill>
-                <a:latin typeface="Consolas"/>
-              </a:rPr>
-              <a:t>                _</a:t>
-            </a:r>
-            <a:r>
-              <a:rPr lang="en-GB" sz="1400" dirty="0" err="1">
-                <a:solidFill>
-                  <a:prstClr val="black"/>
-                </a:solidFill>
-                <a:latin typeface="Consolas"/>
-              </a:rPr>
-              <a:t>daoUser.Insert</a:t>
-            </a:r>
-            <a:r>
-              <a:rPr lang="en-GB" sz="1400" dirty="0">
-                <a:solidFill>
-                  <a:prstClr val="black"/>
-                </a:solidFill>
-                <a:latin typeface="Consolas"/>
-              </a:rPr>
               <a:t>(user);</a:t>
             </a:r>
           </a:p>
           <a:p>
             <a:r>
-              <a:rPr lang="en-GB" sz="1400" dirty="0">
-                <a:solidFill>
-                  <a:prstClr val="black"/>
-                </a:solidFill>
-                <a:latin typeface="Consolas"/>
-              </a:rPr>
-              <a:t>            </a:t>
-            </a:r>
-            <a:r>
-              <a:rPr lang="en-GB" sz="1400" dirty="0">
-                <a:solidFill>
-                  <a:srgbClr val="0000FF"/>
-                </a:solidFill>
-                <a:latin typeface="Consolas"/>
-              </a:rPr>
-              <a:t>else</a:t>
-            </a:r>
-            <a:endParaRPr lang="en-GB" sz="1400" dirty="0">
-              <a:solidFill>
-                <a:prstClr val="black"/>
-              </a:solidFill>
-              <a:latin typeface="Consolas"/>
-            </a:endParaRPr>
-          </a:p>
-          <a:p>
-            <a:r>
-              <a:rPr lang="en-GB" sz="1400" dirty="0">
-                <a:solidFill>
-                  <a:prstClr val="black"/>
-                </a:solidFill>
-                <a:latin typeface="Consolas"/>
-              </a:rPr>
-              <a:t>                _</a:t>
-            </a:r>
-            <a:r>
-              <a:rPr lang="en-GB" sz="1400" dirty="0" err="1">
-                <a:solidFill>
-                  <a:prstClr val="black"/>
-                </a:solidFill>
-                <a:latin typeface="Consolas"/>
-              </a:rPr>
-              <a:t>daoUser.Update</a:t>
-            </a:r>
-            <a:r>
-              <a:rPr lang="en-GB" sz="1400" dirty="0">
-                <a:solidFill>
-                  <a:prstClr val="black"/>
-                </a:solidFill>
-                <a:latin typeface="Consolas"/>
-              </a:rPr>
-              <a:t>(user);</a:t>
-            </a:r>
-          </a:p>
-          <a:p>
-            <a:r>
               <a:rPr lang="ru-RU" sz="1400" dirty="0">
                 <a:solidFill>
                   <a:prstClr val="black"/>
@@ -11918,16 +11666,7 @@
                 </a:solidFill>
                 <a:latin typeface="Consolas"/>
               </a:rPr>
-              <a:t>    </a:t>
-            </a:r>
-            <a:r>
-              <a:rPr lang="ru-RU" sz="1400" dirty="0">
-                <a:solidFill>
-                  <a:prstClr val="black"/>
-                </a:solidFill>
-                <a:latin typeface="Consolas"/>
-              </a:rPr>
-              <a:t>}</a:t>
+              <a:t>    }</a:t>
             </a:r>
             <a:endParaRPr lang="ru-RU" sz="1400" dirty="0"/>
           </a:p>
@@ -12072,12 +11811,6 @@
               </a:rPr>
               <a:t>()</a:t>
             </a:r>
-            <a:endParaRPr lang="en-GB" sz="1400" dirty="0">
-              <a:solidFill>
-                <a:prstClr val="black"/>
-              </a:solidFill>
-              <a:latin typeface="Consolas"/>
-            </a:endParaRPr>
           </a:p>
           <a:p>
             <a:r>
@@ -12471,25 +12204,7 @@
                 </a:solidFill>
                 <a:latin typeface="Consolas"/>
               </a:rPr>
-              <a:t>        </a:t>
-            </a:r>
-            <a:r>
-              <a:rPr lang="en-GB" sz="1400" dirty="0">
-                <a:solidFill>
-                  <a:prstClr val="black"/>
-                </a:solidFill>
-                <a:latin typeface="Consolas"/>
-              </a:rPr>
-              <a:t>container </a:t>
-            </a:r>
-            <a:r>
-              <a:rPr lang="en-GB" sz="1400" dirty="0">
-                <a:solidFill>
-                  <a:prstClr val="black"/>
-                </a:solidFill>
-                <a:latin typeface="Consolas"/>
-              </a:rPr>
-              <a:t>= </a:t>
+              <a:t>        container = </a:t>
             </a:r>
             <a:r>
               <a:rPr lang="en-GB" sz="1400" dirty="0" err="1">
@@ -12547,59 +12262,44 @@
                 </a:solidFill>
                 <a:latin typeface="Consolas"/>
               </a:rPr>
+              <a:t>    </a:t>
+            </a:r>
+            <a:r>
+              <a:rPr lang="en-GB" sz="1400" dirty="0">
+                <a:solidFill>
+                  <a:srgbClr val="0000FF"/>
+                </a:solidFill>
+                <a:latin typeface="Consolas"/>
+              </a:rPr>
+              <a:t>void</a:t>
+            </a:r>
+            <a:r>
+              <a:rPr lang="en-GB" sz="1400" dirty="0">
+                <a:solidFill>
+                  <a:prstClr val="black"/>
+                </a:solidFill>
+                <a:latin typeface="Consolas"/>
+              </a:rPr>
               <a:t> </a:t>
             </a:r>
             <a:r>
-              <a:rPr lang="ru-RU" sz="1400" dirty="0">
-                <a:solidFill>
-                  <a:srgbClr val="0000FF"/>
-                </a:solidFill>
-                <a:latin typeface="Consolas"/>
-              </a:rPr>
-              <a:t>   </a:t>
+              <a:rPr lang="en-GB" sz="1400" dirty="0" err="1">
+                <a:solidFill>
+                  <a:prstClr val="black"/>
+                </a:solidFill>
+                <a:latin typeface="Consolas"/>
+              </a:rPr>
+              <a:t>UseContainer</a:t>
             </a:r>
             <a:r>
               <a:rPr lang="en-GB" sz="1400" dirty="0">
                 <a:solidFill>
-                  <a:srgbClr val="0000FF"/>
-                </a:solidFill>
-                <a:latin typeface="Consolas"/>
-              </a:rPr>
-              <a:t>void</a:t>
-            </a:r>
-            <a:r>
-              <a:rPr lang="en-GB" sz="1400" dirty="0">
-                <a:solidFill>
-                  <a:prstClr val="black"/>
-                </a:solidFill>
-                <a:latin typeface="Consolas"/>
-              </a:rPr>
-              <a:t> </a:t>
-            </a:r>
-            <a:r>
-              <a:rPr lang="en-GB" sz="1400" dirty="0" err="1">
-                <a:solidFill>
-                  <a:prstClr val="black"/>
-                </a:solidFill>
-                <a:latin typeface="Consolas"/>
-              </a:rPr>
-              <a:t>UseContainer</a:t>
-            </a:r>
-            <a:r>
-              <a:rPr lang="en-GB" sz="1400" dirty="0">
-                <a:solidFill>
                   <a:prstClr val="black"/>
                 </a:solidFill>
                 <a:latin typeface="Consolas"/>
               </a:rPr>
               <a:t>()</a:t>
             </a:r>
-            <a:endParaRPr lang="en-GB" sz="1400" dirty="0">
-              <a:solidFill>
-                <a:prstClr val="black"/>
-              </a:solidFill>
-              <a:latin typeface="Consolas"/>
-            </a:endParaRPr>
           </a:p>
           <a:p>
             <a:r>
@@ -13242,7 +12942,7 @@
           <a:p>
             <a:r>
               <a:rPr lang="ru-RU" dirty="0" smtClean="0"/>
-              <a:t>Прочие моменты</a:t>
+              <a:t>Проверка покрытия</a:t>
             </a:r>
             <a:endParaRPr lang="ru-RU" dirty="0"/>
           </a:p>
@@ -13768,7 +13468,19 @@
           <a:p>
             <a:r>
               <a:rPr lang="en-US" dirty="0" smtClean="0"/>
-              <a:t>Test Driven Design (TDD)</a:t>
+              <a:t>Test Driven </a:t>
+            </a:r>
+            <a:r>
+              <a:rPr lang="en-US" dirty="0" smtClean="0"/>
+              <a:t>Development</a:t>
+            </a:r>
+            <a:r>
+              <a:rPr lang="en-US" dirty="0" smtClean="0"/>
+              <a:t> </a:t>
+            </a:r>
+            <a:r>
+              <a:rPr lang="en-US" dirty="0" smtClean="0"/>
+              <a:t>(TDD)</a:t>
             </a:r>
             <a:endParaRPr lang="ru-RU" dirty="0"/>
           </a:p>
@@ -13789,7 +13501,19 @@
           <a:bodyPr/>
           <a:lstStyle/>
           <a:p>
-            <a:endParaRPr lang="ru-RU"/>
+            <a:r>
+              <a:rPr lang="en-US" dirty="0"/>
+              <a:t>Test Driven </a:t>
+            </a:r>
+            <a:r>
+              <a:rPr lang="en-US" dirty="0" smtClean="0"/>
+              <a:t>Design</a:t>
+            </a:r>
+            <a:r>
+              <a:rPr lang="ru-RU" dirty="0" smtClean="0"/>
+              <a:t> (?)</a:t>
+            </a:r>
+            <a:endParaRPr lang="ru-RU" dirty="0"/>
           </a:p>
         </p:txBody>
       </p:sp>
@@ -16331,6 +16055,59 @@
 </p:sld>
 </file>
 
+<file path=ppt/slides/slide31.xml><?xml version="1.0" encoding="utf-8"?>
+<p:sld xmlns:a="http://schemas.openxmlformats.org/drawingml/2006/main" xmlns:r="http://schemas.openxmlformats.org/officeDocument/2006/relationships" xmlns:p="http://schemas.openxmlformats.org/presentationml/2006/main">
+  <p:cSld>
+    <p:spTree>
+      <p:nvGrpSpPr>
+        <p:cNvPr id="1" name=""/>
+        <p:cNvGrpSpPr/>
+        <p:nvPr/>
+      </p:nvGrpSpPr>
+      <p:grpSpPr>
+        <a:xfrm>
+          <a:off x="0" y="0"/>
+          <a:ext cx="0" cy="0"/>
+          <a:chOff x="0" y="0"/>
+          <a:chExt cx="0" cy="0"/>
+        </a:xfrm>
+      </p:grpSpPr>
+      <p:sp>
+        <p:nvSpPr>
+          <p:cNvPr id="2" name="Заголовок 1"/>
+          <p:cNvSpPr>
+            <a:spLocks noGrp="1"/>
+          </p:cNvSpPr>
+          <p:nvPr>
+            <p:ph type="title"/>
+          </p:nvPr>
+        </p:nvSpPr>
+        <p:spPr/>
+        <p:txBody>
+          <a:bodyPr/>
+          <a:lstStyle/>
+          <a:p>
+            <a:r>
+              <a:rPr lang="en-US" dirty="0" smtClean="0"/>
+              <a:t>DEMO</a:t>
+            </a:r>
+            <a:endParaRPr lang="ru-RU" dirty="0"/>
+          </a:p>
+        </p:txBody>
+      </p:sp>
+    </p:spTree>
+    <p:extLst>
+      <p:ext uri="{BB962C8B-B14F-4D97-AF65-F5344CB8AC3E}">
+        <p14:creationId xmlns:p14="http://schemas.microsoft.com/office/powerpoint/2010/main" val="16354400"/>
+      </p:ext>
+    </p:extLst>
+  </p:cSld>
+  <p:clrMapOvr>
+    <a:masterClrMapping/>
+  </p:clrMapOvr>
+</p:sld>
+</file>
+
 <file path=ppt/slides/slide4.xml><?xml version="1.0" encoding="utf-8"?>
 <p:sld xmlns:a="http://schemas.openxmlformats.org/drawingml/2006/main" xmlns:r="http://schemas.openxmlformats.org/officeDocument/2006/relationships" xmlns:p="http://schemas.openxmlformats.org/presentationml/2006/main">
   <p:cSld>

</xml_diff>